<commit_message>
add final project report
</commit_message>
<xml_diff>
--- a/consumer_complaints_project_slides.pptx
+++ b/consumer_complaints_project_slides.pptx
@@ -1903,14 +1903,8 @@
         <a:lstStyle/>
         <a:p>
           <a:r>
-            <a:rPr lang="en-US" b="0" i="0" baseline="0" dirty="0"/>
-            <a:t>Train test split &amp;</a:t>
-          </a:r>
-        </a:p>
-        <a:p>
-          <a:r>
-            <a:rPr lang="en-US" b="0" i="0" baseline="0" dirty="0"/>
-            <a:t>Under Sampling</a:t>
+            <a:rPr lang="en-US" b="0" i="0" baseline="0" dirty="0" smtClean="0"/>
+            <a:t>Over Sampling (SMOTE)</a:t>
           </a:r>
           <a:endParaRPr lang="en-US" dirty="0"/>
         </a:p>
@@ -1938,8 +1932,8 @@
         </a:p>
       </dgm:t>
     </dgm:pt>
-    <mc:AlternateContent xmlns:mc="http://schemas.openxmlformats.org/markup-compatibility/2006">
-      <mc:Choice xmlns:a14="http://schemas.microsoft.com/office/drawing/2010/main" Requires="a14">
+    <mc:AlternateContent xmlns:mc="http://schemas.openxmlformats.org/markup-compatibility/2006" xmlns:a14="http://schemas.microsoft.com/office/drawing/2010/main">
+      <mc:Choice Requires="a14">
         <dgm:pt modelId="{D735D768-D29C-964B-BFD8-7EB3F824FD3F}">
           <dgm:prSet/>
           <dgm:spPr/>
@@ -2010,7 +2004,7 @@
           </dgm:t>
         </dgm:pt>
       </mc:Choice>
-      <mc:Fallback>
+      <mc:Fallback xmlns="">
         <dgm:pt modelId="{D735D768-D29C-964B-BFD8-7EB3F824FD3F}">
           <dgm:prSet/>
           <dgm:spPr/>
@@ -2403,29 +2397,29 @@
     </dgm:pt>
   </dgm:ptLst>
   <dgm:cxnLst>
+    <dgm:cxn modelId="{3A12E236-8D6B-8845-A58B-7A440676BCD4}" srcId="{10FFF7CE-2BCF-C148-949B-0FAF0DAD97AA}" destId="{D735D768-D29C-964B-BFD8-7EB3F824FD3F}" srcOrd="1" destOrd="0" parTransId="{309397BE-D476-D644-AA3D-214C3A4FE062}" sibTransId="{58C1B60A-0535-D743-BD7B-9FB8FA19DE32}"/>
     <dgm:cxn modelId="{2EE23222-6728-DD48-BB89-C5D1A310BC86}" type="presOf" srcId="{9E5BBEAA-C457-7B40-A008-5EF9EE0CFB31}" destId="{E4F88C7D-98C0-2043-89DB-1F00B8B6E6B3}" srcOrd="1" destOrd="0" presId="urn:microsoft.com/office/officeart/2005/8/layout/process5"/>
-    <dgm:cxn modelId="{37D43335-2BDF-6F43-9B21-F8D3C38B037F}" type="presOf" srcId="{C61FD49E-4016-B540-890A-B9DD3C4CAEFC}" destId="{5AF6E921-B27B-AD46-BAF4-57FF3C7B6F6F}" srcOrd="0" destOrd="0" presId="urn:microsoft.com/office/officeart/2005/8/layout/process5"/>
+    <dgm:cxn modelId="{E70D7485-93FE-374D-9E8D-25EDA904F079}" srcId="{10FFF7CE-2BCF-C148-949B-0FAF0DAD97AA}" destId="{961F7DB5-9242-3442-A3D9-ED85AC26E626}" srcOrd="2" destOrd="0" parTransId="{2CFE1E88-7051-6F40-9AEB-6CD080174FCF}" sibTransId="{4B5F23E5-CE8D-2440-A966-79104F941168}"/>
+    <dgm:cxn modelId="{687331FD-6D27-7540-9CD0-361B400DFC67}" type="presOf" srcId="{194CA865-2496-724E-963B-B03058E57857}" destId="{B6BFFA8D-ADB7-7044-A704-A26098D64610}" srcOrd="1" destOrd="0" presId="urn:microsoft.com/office/officeart/2005/8/layout/process5"/>
+    <dgm:cxn modelId="{34784BE6-12BA-7C4E-B001-801B50EC59ED}" type="presOf" srcId="{58C1B60A-0535-D743-BD7B-9FB8FA19DE32}" destId="{3ACB1B5F-3396-A440-B7B5-671662B035D0}" srcOrd="1" destOrd="0" presId="urn:microsoft.com/office/officeart/2005/8/layout/process5"/>
     <dgm:cxn modelId="{258A526D-2B99-A24F-9E50-3CD1E94E021B}" srcId="{10FFF7CE-2BCF-C148-949B-0FAF0DAD97AA}" destId="{DA263650-79F9-6544-A752-0CF99A2B4257}" srcOrd="4" destOrd="0" parTransId="{5D93D232-02C2-6F4F-9E93-A91EE2BD0E69}" sibTransId="{194CA865-2496-724E-963B-B03058E57857}"/>
+    <dgm:cxn modelId="{74E1B0B5-E64E-4849-A47F-5F494F178AF1}" type="presOf" srcId="{961F7DB5-9242-3442-A3D9-ED85AC26E626}" destId="{FCBCDB67-5FA6-E24C-871C-2651823E918B}" srcOrd="0" destOrd="0" presId="urn:microsoft.com/office/officeart/2005/8/layout/process5"/>
+    <dgm:cxn modelId="{F9659DA5-E18E-E140-ADD9-1B910670FF1C}" type="presOf" srcId="{B04A7DC2-3CA3-A244-AB51-53F302ABDFB1}" destId="{8D56218D-E590-5345-AC3E-27D720AD3BFA}" srcOrd="0" destOrd="0" presId="urn:microsoft.com/office/officeart/2005/8/layout/process5"/>
+    <dgm:cxn modelId="{E47271CA-CBBA-0C4A-9BC8-3B73BC21E801}" type="presOf" srcId="{58C1B60A-0535-D743-BD7B-9FB8FA19DE32}" destId="{A3E80121-5B2B-4042-88D9-21EBE3A87682}" srcOrd="0" destOrd="0" presId="urn:microsoft.com/office/officeart/2005/8/layout/process5"/>
+    <dgm:cxn modelId="{06A56380-2B89-D740-A803-A23985CEA75A}" srcId="{10FFF7CE-2BCF-C148-949B-0FAF0DAD97AA}" destId="{C61FD49E-4016-B540-890A-B9DD3C4CAEFC}" srcOrd="0" destOrd="0" parTransId="{F42F14E0-A406-884A-9B92-F2FE477E8461}" sibTransId="{2CC926CB-D1CC-4A4D-8E4C-9319F5E1944C}"/>
     <dgm:cxn modelId="{6511AF2B-B790-FE41-A6F6-674035E525B8}" type="presOf" srcId="{2CC926CB-D1CC-4A4D-8E4C-9319F5E1944C}" destId="{D798B5E6-7301-A74F-BAFA-138AFB665563}" srcOrd="1" destOrd="0" presId="urn:microsoft.com/office/officeart/2005/8/layout/process5"/>
-    <dgm:cxn modelId="{687331FD-6D27-7540-9CD0-361B400DFC67}" type="presOf" srcId="{194CA865-2496-724E-963B-B03058E57857}" destId="{B6BFFA8D-ADB7-7044-A704-A26098D64610}" srcOrd="1" destOrd="0" presId="urn:microsoft.com/office/officeart/2005/8/layout/process5"/>
-    <dgm:cxn modelId="{F9659DA5-E18E-E140-ADD9-1B910670FF1C}" type="presOf" srcId="{B04A7DC2-3CA3-A244-AB51-53F302ABDFB1}" destId="{8D56218D-E590-5345-AC3E-27D720AD3BFA}" srcOrd="0" destOrd="0" presId="urn:microsoft.com/office/officeart/2005/8/layout/process5"/>
+    <dgm:cxn modelId="{2700903A-ECBD-CC4E-B8DE-77B0B96E958F}" type="presOf" srcId="{D735D768-D29C-964B-BFD8-7EB3F824FD3F}" destId="{55E31240-2723-FA44-BC34-9330C946D4B4}" srcOrd="0" destOrd="0" presId="urn:microsoft.com/office/officeart/2005/8/layout/process5"/>
+    <dgm:cxn modelId="{1AB5D8EF-22F9-AE43-B124-08565CC2F3AB}" type="presOf" srcId="{9E5BBEAA-C457-7B40-A008-5EF9EE0CFB31}" destId="{8813CF35-5557-B34F-A3FE-5BC999129080}" srcOrd="0" destOrd="0" presId="urn:microsoft.com/office/officeart/2005/8/layout/process5"/>
+    <dgm:cxn modelId="{A09318B9-9442-2B4F-84E9-22EA503582BE}" type="presOf" srcId="{DA263650-79F9-6544-A752-0CF99A2B4257}" destId="{4C0D1463-3207-3941-A057-5F4869F0811B}" srcOrd="0" destOrd="0" presId="urn:microsoft.com/office/officeart/2005/8/layout/process5"/>
     <dgm:cxn modelId="{2541FF8E-21F5-B748-9181-D6734558AB0D}" type="presOf" srcId="{4B5F23E5-CE8D-2440-A966-79104F941168}" destId="{CE66C1F3-045D-834D-B802-5CE1B81D7553}" srcOrd="1" destOrd="0" presId="urn:microsoft.com/office/officeart/2005/8/layout/process5"/>
     <dgm:cxn modelId="{D84D95AD-A7D1-9C48-904D-24B714D584AE}" srcId="{10FFF7CE-2BCF-C148-949B-0FAF0DAD97AA}" destId="{B04A7DC2-3CA3-A244-AB51-53F302ABDFB1}" srcOrd="5" destOrd="0" parTransId="{24F98766-9BB8-4646-A023-81BC4A319975}" sibTransId="{8B4C928B-E485-6C4C-AE16-ED7AE3C042F4}"/>
+    <dgm:cxn modelId="{A63A3DC2-DA10-794E-88AA-097E7C40E468}" srcId="{10FFF7CE-2BCF-C148-949B-0FAF0DAD97AA}" destId="{DEC5D76B-3363-824F-81C9-0FF8EB264524}" srcOrd="3" destOrd="0" parTransId="{B5F75FEC-7CFA-6E4E-8A34-3CDF46B608D8}" sibTransId="{9E5BBEAA-C457-7B40-A008-5EF9EE0CFB31}"/>
+    <dgm:cxn modelId="{37CF1B5C-0AF7-E84C-BF6B-8DB63456464B}" type="presOf" srcId="{4B5F23E5-CE8D-2440-A966-79104F941168}" destId="{48300AEE-3656-954D-ADEA-B099BA3F476E}" srcOrd="0" destOrd="0" presId="urn:microsoft.com/office/officeart/2005/8/layout/process5"/>
+    <dgm:cxn modelId="{327D35D9-8AD4-2742-A213-2073CDDC6587}" type="presOf" srcId="{10FFF7CE-2BCF-C148-949B-0FAF0DAD97AA}" destId="{276AE207-F6BE-884E-8A30-2C04B02D3BF1}" srcOrd="0" destOrd="0" presId="urn:microsoft.com/office/officeart/2005/8/layout/process5"/>
+    <dgm:cxn modelId="{CD169D9C-A6EF-F043-A795-3BD05FD94D18}" type="presOf" srcId="{194CA865-2496-724E-963B-B03058E57857}" destId="{82A1B593-AA07-FD4C-9D40-90D916572E24}" srcOrd="0" destOrd="0" presId="urn:microsoft.com/office/officeart/2005/8/layout/process5"/>
+    <dgm:cxn modelId="{37D43335-2BDF-6F43-9B21-F8D3C38B037F}" type="presOf" srcId="{C61FD49E-4016-B540-890A-B9DD3C4CAEFC}" destId="{5AF6E921-B27B-AD46-BAF4-57FF3C7B6F6F}" srcOrd="0" destOrd="0" presId="urn:microsoft.com/office/officeart/2005/8/layout/process5"/>
+    <dgm:cxn modelId="{6C1EE3C1-156C-2542-AA5D-7F3930C76D91}" type="presOf" srcId="{2CC926CB-D1CC-4A4D-8E4C-9319F5E1944C}" destId="{00D0904F-F387-3645-97F8-595C14055D1D}" srcOrd="0" destOrd="0" presId="urn:microsoft.com/office/officeart/2005/8/layout/process5"/>
     <dgm:cxn modelId="{0F3A01BB-33B1-9544-8275-CDDFF71B8EA4}" type="presOf" srcId="{DEC5D76B-3363-824F-81C9-0FF8EB264524}" destId="{C3A95163-87AA-FE47-BDAF-07209D0F8629}" srcOrd="0" destOrd="0" presId="urn:microsoft.com/office/officeart/2005/8/layout/process5"/>
-    <dgm:cxn modelId="{CD169D9C-A6EF-F043-A795-3BD05FD94D18}" type="presOf" srcId="{194CA865-2496-724E-963B-B03058E57857}" destId="{82A1B593-AA07-FD4C-9D40-90D916572E24}" srcOrd="0" destOrd="0" presId="urn:microsoft.com/office/officeart/2005/8/layout/process5"/>
-    <dgm:cxn modelId="{A63A3DC2-DA10-794E-88AA-097E7C40E468}" srcId="{10FFF7CE-2BCF-C148-949B-0FAF0DAD97AA}" destId="{DEC5D76B-3363-824F-81C9-0FF8EB264524}" srcOrd="3" destOrd="0" parTransId="{B5F75FEC-7CFA-6E4E-8A34-3CDF46B608D8}" sibTransId="{9E5BBEAA-C457-7B40-A008-5EF9EE0CFB31}"/>
-    <dgm:cxn modelId="{6C1EE3C1-156C-2542-AA5D-7F3930C76D91}" type="presOf" srcId="{2CC926CB-D1CC-4A4D-8E4C-9319F5E1944C}" destId="{00D0904F-F387-3645-97F8-595C14055D1D}" srcOrd="0" destOrd="0" presId="urn:microsoft.com/office/officeart/2005/8/layout/process5"/>
-    <dgm:cxn modelId="{34784BE6-12BA-7C4E-B001-801B50EC59ED}" type="presOf" srcId="{58C1B60A-0535-D743-BD7B-9FB8FA19DE32}" destId="{3ACB1B5F-3396-A440-B7B5-671662B035D0}" srcOrd="1" destOrd="0" presId="urn:microsoft.com/office/officeart/2005/8/layout/process5"/>
-    <dgm:cxn modelId="{37CF1B5C-0AF7-E84C-BF6B-8DB63456464B}" type="presOf" srcId="{4B5F23E5-CE8D-2440-A966-79104F941168}" destId="{48300AEE-3656-954D-ADEA-B099BA3F476E}" srcOrd="0" destOrd="0" presId="urn:microsoft.com/office/officeart/2005/8/layout/process5"/>
-    <dgm:cxn modelId="{E70D7485-93FE-374D-9E8D-25EDA904F079}" srcId="{10FFF7CE-2BCF-C148-949B-0FAF0DAD97AA}" destId="{961F7DB5-9242-3442-A3D9-ED85AC26E626}" srcOrd="2" destOrd="0" parTransId="{2CFE1E88-7051-6F40-9AEB-6CD080174FCF}" sibTransId="{4B5F23E5-CE8D-2440-A966-79104F941168}"/>
-    <dgm:cxn modelId="{327D35D9-8AD4-2742-A213-2073CDDC6587}" type="presOf" srcId="{10FFF7CE-2BCF-C148-949B-0FAF0DAD97AA}" destId="{276AE207-F6BE-884E-8A30-2C04B02D3BF1}" srcOrd="0" destOrd="0" presId="urn:microsoft.com/office/officeart/2005/8/layout/process5"/>
-    <dgm:cxn modelId="{A09318B9-9442-2B4F-84E9-22EA503582BE}" type="presOf" srcId="{DA263650-79F9-6544-A752-0CF99A2B4257}" destId="{4C0D1463-3207-3941-A057-5F4869F0811B}" srcOrd="0" destOrd="0" presId="urn:microsoft.com/office/officeart/2005/8/layout/process5"/>
-    <dgm:cxn modelId="{1AB5D8EF-22F9-AE43-B124-08565CC2F3AB}" type="presOf" srcId="{9E5BBEAA-C457-7B40-A008-5EF9EE0CFB31}" destId="{8813CF35-5557-B34F-A3FE-5BC999129080}" srcOrd="0" destOrd="0" presId="urn:microsoft.com/office/officeart/2005/8/layout/process5"/>
-    <dgm:cxn modelId="{E47271CA-CBBA-0C4A-9BC8-3B73BC21E801}" type="presOf" srcId="{58C1B60A-0535-D743-BD7B-9FB8FA19DE32}" destId="{A3E80121-5B2B-4042-88D9-21EBE3A87682}" srcOrd="0" destOrd="0" presId="urn:microsoft.com/office/officeart/2005/8/layout/process5"/>
-    <dgm:cxn modelId="{06A56380-2B89-D740-A803-A23985CEA75A}" srcId="{10FFF7CE-2BCF-C148-949B-0FAF0DAD97AA}" destId="{C61FD49E-4016-B540-890A-B9DD3C4CAEFC}" srcOrd="0" destOrd="0" parTransId="{F42F14E0-A406-884A-9B92-F2FE477E8461}" sibTransId="{2CC926CB-D1CC-4A4D-8E4C-9319F5E1944C}"/>
-    <dgm:cxn modelId="{2700903A-ECBD-CC4E-B8DE-77B0B96E958F}" type="presOf" srcId="{D735D768-D29C-964B-BFD8-7EB3F824FD3F}" destId="{55E31240-2723-FA44-BC34-9330C946D4B4}" srcOrd="0" destOrd="0" presId="urn:microsoft.com/office/officeart/2005/8/layout/process5"/>
-    <dgm:cxn modelId="{3A12E236-8D6B-8845-A58B-7A440676BCD4}" srcId="{10FFF7CE-2BCF-C148-949B-0FAF0DAD97AA}" destId="{D735D768-D29C-964B-BFD8-7EB3F824FD3F}" srcOrd="1" destOrd="0" parTransId="{309397BE-D476-D644-AA3D-214C3A4FE062}" sibTransId="{58C1B60A-0535-D743-BD7B-9FB8FA19DE32}"/>
-    <dgm:cxn modelId="{74E1B0B5-E64E-4849-A47F-5F494F178AF1}" type="presOf" srcId="{961F7DB5-9242-3442-A3D9-ED85AC26E626}" destId="{FCBCDB67-5FA6-E24C-871C-2651823E918B}" srcOrd="0" destOrd="0" presId="urn:microsoft.com/office/officeart/2005/8/layout/process5"/>
     <dgm:cxn modelId="{9F057208-7BB9-1D4D-BCCB-CB8EF5A84BB7}" type="presParOf" srcId="{276AE207-F6BE-884E-8A30-2C04B02D3BF1}" destId="{5AF6E921-B27B-AD46-BAF4-57FF3C7B6F6F}" srcOrd="0" destOrd="0" presId="urn:microsoft.com/office/officeart/2005/8/layout/process5"/>
     <dgm:cxn modelId="{B27AF8CB-2A43-8247-92DF-777867366F4C}" type="presParOf" srcId="{276AE207-F6BE-884E-8A30-2C04B02D3BF1}" destId="{00D0904F-F387-3645-97F8-595C14055D1D}" srcOrd="1" destOrd="0" presId="urn:microsoft.com/office/officeart/2005/8/layout/process5"/>
     <dgm:cxn modelId="{F29BF58E-20CF-CB44-8AF0-C65D519DA74B}" type="presParOf" srcId="{00D0904F-F387-3645-97F8-595C14055D1D}" destId="{D798B5E6-7301-A74F-BAFA-138AFB665563}" srcOrd="0" destOrd="0" presId="urn:microsoft.com/office/officeart/2005/8/layout/process5"/>
@@ -2520,14 +2514,8 @@
         <a:lstStyle/>
         <a:p>
           <a:r>
-            <a:rPr lang="en-US" b="0" i="0" baseline="0" dirty="0"/>
-            <a:t>Train test split &amp;</a:t>
-          </a:r>
-        </a:p>
-        <a:p>
-          <a:r>
-            <a:rPr lang="en-US" b="0" i="0" baseline="0" dirty="0"/>
-            <a:t>Under Sampling</a:t>
+            <a:rPr lang="en-US" b="0" i="0" baseline="0" dirty="0" smtClean="0"/>
+            <a:t>Over Sampling (SMOTE)</a:t>
           </a:r>
           <a:endParaRPr lang="en-US" dirty="0"/>
         </a:p>
@@ -2926,29 +2914,29 @@
     </dgm:pt>
   </dgm:ptLst>
   <dgm:cxnLst>
+    <dgm:cxn modelId="{3A12E236-8D6B-8845-A58B-7A440676BCD4}" srcId="{10FFF7CE-2BCF-C148-949B-0FAF0DAD97AA}" destId="{D735D768-D29C-964B-BFD8-7EB3F824FD3F}" srcOrd="1" destOrd="0" parTransId="{309397BE-D476-D644-AA3D-214C3A4FE062}" sibTransId="{58C1B60A-0535-D743-BD7B-9FB8FA19DE32}"/>
     <dgm:cxn modelId="{2EE23222-6728-DD48-BB89-C5D1A310BC86}" type="presOf" srcId="{9E5BBEAA-C457-7B40-A008-5EF9EE0CFB31}" destId="{E4F88C7D-98C0-2043-89DB-1F00B8B6E6B3}" srcOrd="1" destOrd="0" presId="urn:microsoft.com/office/officeart/2005/8/layout/process5"/>
-    <dgm:cxn modelId="{37D43335-2BDF-6F43-9B21-F8D3C38B037F}" type="presOf" srcId="{C61FD49E-4016-B540-890A-B9DD3C4CAEFC}" destId="{5AF6E921-B27B-AD46-BAF4-57FF3C7B6F6F}" srcOrd="0" destOrd="0" presId="urn:microsoft.com/office/officeart/2005/8/layout/process5"/>
+    <dgm:cxn modelId="{E70D7485-93FE-374D-9E8D-25EDA904F079}" srcId="{10FFF7CE-2BCF-C148-949B-0FAF0DAD97AA}" destId="{961F7DB5-9242-3442-A3D9-ED85AC26E626}" srcOrd="2" destOrd="0" parTransId="{2CFE1E88-7051-6F40-9AEB-6CD080174FCF}" sibTransId="{4B5F23E5-CE8D-2440-A966-79104F941168}"/>
+    <dgm:cxn modelId="{687331FD-6D27-7540-9CD0-361B400DFC67}" type="presOf" srcId="{194CA865-2496-724E-963B-B03058E57857}" destId="{B6BFFA8D-ADB7-7044-A704-A26098D64610}" srcOrd="1" destOrd="0" presId="urn:microsoft.com/office/officeart/2005/8/layout/process5"/>
+    <dgm:cxn modelId="{34784BE6-12BA-7C4E-B001-801B50EC59ED}" type="presOf" srcId="{58C1B60A-0535-D743-BD7B-9FB8FA19DE32}" destId="{3ACB1B5F-3396-A440-B7B5-671662B035D0}" srcOrd="1" destOrd="0" presId="urn:microsoft.com/office/officeart/2005/8/layout/process5"/>
     <dgm:cxn modelId="{258A526D-2B99-A24F-9E50-3CD1E94E021B}" srcId="{10FFF7CE-2BCF-C148-949B-0FAF0DAD97AA}" destId="{DA263650-79F9-6544-A752-0CF99A2B4257}" srcOrd="4" destOrd="0" parTransId="{5D93D232-02C2-6F4F-9E93-A91EE2BD0E69}" sibTransId="{194CA865-2496-724E-963B-B03058E57857}"/>
+    <dgm:cxn modelId="{74E1B0B5-E64E-4849-A47F-5F494F178AF1}" type="presOf" srcId="{961F7DB5-9242-3442-A3D9-ED85AC26E626}" destId="{FCBCDB67-5FA6-E24C-871C-2651823E918B}" srcOrd="0" destOrd="0" presId="urn:microsoft.com/office/officeart/2005/8/layout/process5"/>
+    <dgm:cxn modelId="{F9659DA5-E18E-E140-ADD9-1B910670FF1C}" type="presOf" srcId="{B04A7DC2-3CA3-A244-AB51-53F302ABDFB1}" destId="{8D56218D-E590-5345-AC3E-27D720AD3BFA}" srcOrd="0" destOrd="0" presId="urn:microsoft.com/office/officeart/2005/8/layout/process5"/>
+    <dgm:cxn modelId="{E47271CA-CBBA-0C4A-9BC8-3B73BC21E801}" type="presOf" srcId="{58C1B60A-0535-D743-BD7B-9FB8FA19DE32}" destId="{A3E80121-5B2B-4042-88D9-21EBE3A87682}" srcOrd="0" destOrd="0" presId="urn:microsoft.com/office/officeart/2005/8/layout/process5"/>
+    <dgm:cxn modelId="{06A56380-2B89-D740-A803-A23985CEA75A}" srcId="{10FFF7CE-2BCF-C148-949B-0FAF0DAD97AA}" destId="{C61FD49E-4016-B540-890A-B9DD3C4CAEFC}" srcOrd="0" destOrd="0" parTransId="{F42F14E0-A406-884A-9B92-F2FE477E8461}" sibTransId="{2CC926CB-D1CC-4A4D-8E4C-9319F5E1944C}"/>
     <dgm:cxn modelId="{6511AF2B-B790-FE41-A6F6-674035E525B8}" type="presOf" srcId="{2CC926CB-D1CC-4A4D-8E4C-9319F5E1944C}" destId="{D798B5E6-7301-A74F-BAFA-138AFB665563}" srcOrd="1" destOrd="0" presId="urn:microsoft.com/office/officeart/2005/8/layout/process5"/>
-    <dgm:cxn modelId="{687331FD-6D27-7540-9CD0-361B400DFC67}" type="presOf" srcId="{194CA865-2496-724E-963B-B03058E57857}" destId="{B6BFFA8D-ADB7-7044-A704-A26098D64610}" srcOrd="1" destOrd="0" presId="urn:microsoft.com/office/officeart/2005/8/layout/process5"/>
-    <dgm:cxn modelId="{F9659DA5-E18E-E140-ADD9-1B910670FF1C}" type="presOf" srcId="{B04A7DC2-3CA3-A244-AB51-53F302ABDFB1}" destId="{8D56218D-E590-5345-AC3E-27D720AD3BFA}" srcOrd="0" destOrd="0" presId="urn:microsoft.com/office/officeart/2005/8/layout/process5"/>
+    <dgm:cxn modelId="{2700903A-ECBD-CC4E-B8DE-77B0B96E958F}" type="presOf" srcId="{D735D768-D29C-964B-BFD8-7EB3F824FD3F}" destId="{55E31240-2723-FA44-BC34-9330C946D4B4}" srcOrd="0" destOrd="0" presId="urn:microsoft.com/office/officeart/2005/8/layout/process5"/>
+    <dgm:cxn modelId="{1AB5D8EF-22F9-AE43-B124-08565CC2F3AB}" type="presOf" srcId="{9E5BBEAA-C457-7B40-A008-5EF9EE0CFB31}" destId="{8813CF35-5557-B34F-A3FE-5BC999129080}" srcOrd="0" destOrd="0" presId="urn:microsoft.com/office/officeart/2005/8/layout/process5"/>
+    <dgm:cxn modelId="{A09318B9-9442-2B4F-84E9-22EA503582BE}" type="presOf" srcId="{DA263650-79F9-6544-A752-0CF99A2B4257}" destId="{4C0D1463-3207-3941-A057-5F4869F0811B}" srcOrd="0" destOrd="0" presId="urn:microsoft.com/office/officeart/2005/8/layout/process5"/>
     <dgm:cxn modelId="{2541FF8E-21F5-B748-9181-D6734558AB0D}" type="presOf" srcId="{4B5F23E5-CE8D-2440-A966-79104F941168}" destId="{CE66C1F3-045D-834D-B802-5CE1B81D7553}" srcOrd="1" destOrd="0" presId="urn:microsoft.com/office/officeart/2005/8/layout/process5"/>
     <dgm:cxn modelId="{D84D95AD-A7D1-9C48-904D-24B714D584AE}" srcId="{10FFF7CE-2BCF-C148-949B-0FAF0DAD97AA}" destId="{B04A7DC2-3CA3-A244-AB51-53F302ABDFB1}" srcOrd="5" destOrd="0" parTransId="{24F98766-9BB8-4646-A023-81BC4A319975}" sibTransId="{8B4C928B-E485-6C4C-AE16-ED7AE3C042F4}"/>
+    <dgm:cxn modelId="{A63A3DC2-DA10-794E-88AA-097E7C40E468}" srcId="{10FFF7CE-2BCF-C148-949B-0FAF0DAD97AA}" destId="{DEC5D76B-3363-824F-81C9-0FF8EB264524}" srcOrd="3" destOrd="0" parTransId="{B5F75FEC-7CFA-6E4E-8A34-3CDF46B608D8}" sibTransId="{9E5BBEAA-C457-7B40-A008-5EF9EE0CFB31}"/>
+    <dgm:cxn modelId="{37CF1B5C-0AF7-E84C-BF6B-8DB63456464B}" type="presOf" srcId="{4B5F23E5-CE8D-2440-A966-79104F941168}" destId="{48300AEE-3656-954D-ADEA-B099BA3F476E}" srcOrd="0" destOrd="0" presId="urn:microsoft.com/office/officeart/2005/8/layout/process5"/>
+    <dgm:cxn modelId="{327D35D9-8AD4-2742-A213-2073CDDC6587}" type="presOf" srcId="{10FFF7CE-2BCF-C148-949B-0FAF0DAD97AA}" destId="{276AE207-F6BE-884E-8A30-2C04B02D3BF1}" srcOrd="0" destOrd="0" presId="urn:microsoft.com/office/officeart/2005/8/layout/process5"/>
+    <dgm:cxn modelId="{CD169D9C-A6EF-F043-A795-3BD05FD94D18}" type="presOf" srcId="{194CA865-2496-724E-963B-B03058E57857}" destId="{82A1B593-AA07-FD4C-9D40-90D916572E24}" srcOrd="0" destOrd="0" presId="urn:microsoft.com/office/officeart/2005/8/layout/process5"/>
+    <dgm:cxn modelId="{37D43335-2BDF-6F43-9B21-F8D3C38B037F}" type="presOf" srcId="{C61FD49E-4016-B540-890A-B9DD3C4CAEFC}" destId="{5AF6E921-B27B-AD46-BAF4-57FF3C7B6F6F}" srcOrd="0" destOrd="0" presId="urn:microsoft.com/office/officeart/2005/8/layout/process5"/>
+    <dgm:cxn modelId="{6C1EE3C1-156C-2542-AA5D-7F3930C76D91}" type="presOf" srcId="{2CC926CB-D1CC-4A4D-8E4C-9319F5E1944C}" destId="{00D0904F-F387-3645-97F8-595C14055D1D}" srcOrd="0" destOrd="0" presId="urn:microsoft.com/office/officeart/2005/8/layout/process5"/>
     <dgm:cxn modelId="{0F3A01BB-33B1-9544-8275-CDDFF71B8EA4}" type="presOf" srcId="{DEC5D76B-3363-824F-81C9-0FF8EB264524}" destId="{C3A95163-87AA-FE47-BDAF-07209D0F8629}" srcOrd="0" destOrd="0" presId="urn:microsoft.com/office/officeart/2005/8/layout/process5"/>
-    <dgm:cxn modelId="{CD169D9C-A6EF-F043-A795-3BD05FD94D18}" type="presOf" srcId="{194CA865-2496-724E-963B-B03058E57857}" destId="{82A1B593-AA07-FD4C-9D40-90D916572E24}" srcOrd="0" destOrd="0" presId="urn:microsoft.com/office/officeart/2005/8/layout/process5"/>
-    <dgm:cxn modelId="{A63A3DC2-DA10-794E-88AA-097E7C40E468}" srcId="{10FFF7CE-2BCF-C148-949B-0FAF0DAD97AA}" destId="{DEC5D76B-3363-824F-81C9-0FF8EB264524}" srcOrd="3" destOrd="0" parTransId="{B5F75FEC-7CFA-6E4E-8A34-3CDF46B608D8}" sibTransId="{9E5BBEAA-C457-7B40-A008-5EF9EE0CFB31}"/>
-    <dgm:cxn modelId="{6C1EE3C1-156C-2542-AA5D-7F3930C76D91}" type="presOf" srcId="{2CC926CB-D1CC-4A4D-8E4C-9319F5E1944C}" destId="{00D0904F-F387-3645-97F8-595C14055D1D}" srcOrd="0" destOrd="0" presId="urn:microsoft.com/office/officeart/2005/8/layout/process5"/>
-    <dgm:cxn modelId="{34784BE6-12BA-7C4E-B001-801B50EC59ED}" type="presOf" srcId="{58C1B60A-0535-D743-BD7B-9FB8FA19DE32}" destId="{3ACB1B5F-3396-A440-B7B5-671662B035D0}" srcOrd="1" destOrd="0" presId="urn:microsoft.com/office/officeart/2005/8/layout/process5"/>
-    <dgm:cxn modelId="{37CF1B5C-0AF7-E84C-BF6B-8DB63456464B}" type="presOf" srcId="{4B5F23E5-CE8D-2440-A966-79104F941168}" destId="{48300AEE-3656-954D-ADEA-B099BA3F476E}" srcOrd="0" destOrd="0" presId="urn:microsoft.com/office/officeart/2005/8/layout/process5"/>
-    <dgm:cxn modelId="{E70D7485-93FE-374D-9E8D-25EDA904F079}" srcId="{10FFF7CE-2BCF-C148-949B-0FAF0DAD97AA}" destId="{961F7DB5-9242-3442-A3D9-ED85AC26E626}" srcOrd="2" destOrd="0" parTransId="{2CFE1E88-7051-6F40-9AEB-6CD080174FCF}" sibTransId="{4B5F23E5-CE8D-2440-A966-79104F941168}"/>
-    <dgm:cxn modelId="{327D35D9-8AD4-2742-A213-2073CDDC6587}" type="presOf" srcId="{10FFF7CE-2BCF-C148-949B-0FAF0DAD97AA}" destId="{276AE207-F6BE-884E-8A30-2C04B02D3BF1}" srcOrd="0" destOrd="0" presId="urn:microsoft.com/office/officeart/2005/8/layout/process5"/>
-    <dgm:cxn modelId="{A09318B9-9442-2B4F-84E9-22EA503582BE}" type="presOf" srcId="{DA263650-79F9-6544-A752-0CF99A2B4257}" destId="{4C0D1463-3207-3941-A057-5F4869F0811B}" srcOrd="0" destOrd="0" presId="urn:microsoft.com/office/officeart/2005/8/layout/process5"/>
-    <dgm:cxn modelId="{1AB5D8EF-22F9-AE43-B124-08565CC2F3AB}" type="presOf" srcId="{9E5BBEAA-C457-7B40-A008-5EF9EE0CFB31}" destId="{8813CF35-5557-B34F-A3FE-5BC999129080}" srcOrd="0" destOrd="0" presId="urn:microsoft.com/office/officeart/2005/8/layout/process5"/>
-    <dgm:cxn modelId="{E47271CA-CBBA-0C4A-9BC8-3B73BC21E801}" type="presOf" srcId="{58C1B60A-0535-D743-BD7B-9FB8FA19DE32}" destId="{A3E80121-5B2B-4042-88D9-21EBE3A87682}" srcOrd="0" destOrd="0" presId="urn:microsoft.com/office/officeart/2005/8/layout/process5"/>
-    <dgm:cxn modelId="{06A56380-2B89-D740-A803-A23985CEA75A}" srcId="{10FFF7CE-2BCF-C148-949B-0FAF0DAD97AA}" destId="{C61FD49E-4016-B540-890A-B9DD3C4CAEFC}" srcOrd="0" destOrd="0" parTransId="{F42F14E0-A406-884A-9B92-F2FE477E8461}" sibTransId="{2CC926CB-D1CC-4A4D-8E4C-9319F5E1944C}"/>
-    <dgm:cxn modelId="{2700903A-ECBD-CC4E-B8DE-77B0B96E958F}" type="presOf" srcId="{D735D768-D29C-964B-BFD8-7EB3F824FD3F}" destId="{55E31240-2723-FA44-BC34-9330C946D4B4}" srcOrd="0" destOrd="0" presId="urn:microsoft.com/office/officeart/2005/8/layout/process5"/>
-    <dgm:cxn modelId="{3A12E236-8D6B-8845-A58B-7A440676BCD4}" srcId="{10FFF7CE-2BCF-C148-949B-0FAF0DAD97AA}" destId="{D735D768-D29C-964B-BFD8-7EB3F824FD3F}" srcOrd="1" destOrd="0" parTransId="{309397BE-D476-D644-AA3D-214C3A4FE062}" sibTransId="{58C1B60A-0535-D743-BD7B-9FB8FA19DE32}"/>
-    <dgm:cxn modelId="{74E1B0B5-E64E-4849-A47F-5F494F178AF1}" type="presOf" srcId="{961F7DB5-9242-3442-A3D9-ED85AC26E626}" destId="{FCBCDB67-5FA6-E24C-871C-2651823E918B}" srcOrd="0" destOrd="0" presId="urn:microsoft.com/office/officeart/2005/8/layout/process5"/>
     <dgm:cxn modelId="{9F057208-7BB9-1D4D-BCCB-CB8EF5A84BB7}" type="presParOf" srcId="{276AE207-F6BE-884E-8A30-2C04B02D3BF1}" destId="{5AF6E921-B27B-AD46-BAF4-57FF3C7B6F6F}" srcOrd="0" destOrd="0" presId="urn:microsoft.com/office/officeart/2005/8/layout/process5"/>
     <dgm:cxn modelId="{B27AF8CB-2A43-8247-92DF-777867366F4C}" type="presParOf" srcId="{276AE207-F6BE-884E-8A30-2C04B02D3BF1}" destId="{00D0904F-F387-3645-97F8-595C14055D1D}" srcOrd="1" destOrd="0" presId="urn:microsoft.com/office/officeart/2005/8/layout/process5"/>
     <dgm:cxn modelId="{F29BF58E-20CF-CB44-8AF0-C65D519DA74B}" type="presParOf" srcId="{00D0904F-F387-3645-97F8-595C14055D1D}" destId="{D798B5E6-7301-A74F-BAFA-138AFB665563}" srcOrd="0" destOrd="0" presId="urn:microsoft.com/office/officeart/2005/8/layout/process5"/>
@@ -2999,7 +2987,17 @@
         <a:p>
           <a:r>
             <a:rPr lang="en-US" sz="2400" dirty="0" smtClean="0"/>
-            <a:t>Consumer Narrative Column</a:t>
+            <a:t>Consumer Narrative </a:t>
+          </a:r>
+          <a:r>
+            <a:rPr lang="en-US" sz="2400" dirty="0" smtClean="0"/>
+            <a:t>Column</a:t>
+          </a:r>
+        </a:p>
+        <a:p>
+          <a:r>
+            <a:rPr lang="en-US" sz="2400" dirty="0" smtClean="0"/>
+            <a:t>Train Test Split</a:t>
           </a:r>
           <a:endParaRPr lang="en-US" sz="2400" dirty="0"/>
         </a:p>
@@ -3134,13 +3132,13 @@
     </dgm:pt>
   </dgm:ptLst>
   <dgm:cxnLst>
+    <dgm:cxn modelId="{54655204-F7B4-C54F-B7D9-A566684803BC}" type="presOf" srcId="{2CC926CB-D1CC-4A4D-8E4C-9319F5E1944C}" destId="{D798B5E6-7301-A74F-BAFA-138AFB665563}" srcOrd="1" destOrd="0" presId="urn:microsoft.com/office/officeart/2005/8/layout/process5"/>
+    <dgm:cxn modelId="{82310679-4E1D-4C40-AB27-B13CDFFEB237}" type="presOf" srcId="{D735D768-D29C-964B-BFD8-7EB3F824FD3F}" destId="{55E31240-2723-FA44-BC34-9330C946D4B4}" srcOrd="0" destOrd="0" presId="urn:microsoft.com/office/officeart/2005/8/layout/process5"/>
+    <dgm:cxn modelId="{C32EE3F2-254B-5D47-99A6-89E1AD84DDF2}" type="presOf" srcId="{C61FD49E-4016-B540-890A-B9DD3C4CAEFC}" destId="{5AF6E921-B27B-AD46-BAF4-57FF3C7B6F6F}" srcOrd="0" destOrd="0" presId="urn:microsoft.com/office/officeart/2005/8/layout/process5"/>
+    <dgm:cxn modelId="{680D9BD0-59D6-BA43-A04C-84DF09D16019}" type="presOf" srcId="{10FFF7CE-2BCF-C148-949B-0FAF0DAD97AA}" destId="{276AE207-F6BE-884E-8A30-2C04B02D3BF1}" srcOrd="0" destOrd="0" presId="urn:microsoft.com/office/officeart/2005/8/layout/process5"/>
+    <dgm:cxn modelId="{3A12E236-8D6B-8845-A58B-7A440676BCD4}" srcId="{10FFF7CE-2BCF-C148-949B-0FAF0DAD97AA}" destId="{D735D768-D29C-964B-BFD8-7EB3F824FD3F}" srcOrd="1" destOrd="0" parTransId="{309397BE-D476-D644-AA3D-214C3A4FE062}" sibTransId="{58C1B60A-0535-D743-BD7B-9FB8FA19DE32}"/>
+    <dgm:cxn modelId="{06A56380-2B89-D740-A803-A23985CEA75A}" srcId="{10FFF7CE-2BCF-C148-949B-0FAF0DAD97AA}" destId="{C61FD49E-4016-B540-890A-B9DD3C4CAEFC}" srcOrd="0" destOrd="0" parTransId="{F42F14E0-A406-884A-9B92-F2FE477E8461}" sibTransId="{2CC926CB-D1CC-4A4D-8E4C-9319F5E1944C}"/>
     <dgm:cxn modelId="{21E15D7A-1457-0E49-A749-B0BFA2C7402D}" type="presOf" srcId="{2CC926CB-D1CC-4A4D-8E4C-9319F5E1944C}" destId="{00D0904F-F387-3645-97F8-595C14055D1D}" srcOrd="0" destOrd="0" presId="urn:microsoft.com/office/officeart/2005/8/layout/process5"/>
-    <dgm:cxn modelId="{3A12E236-8D6B-8845-A58B-7A440676BCD4}" srcId="{10FFF7CE-2BCF-C148-949B-0FAF0DAD97AA}" destId="{D735D768-D29C-964B-BFD8-7EB3F824FD3F}" srcOrd="1" destOrd="0" parTransId="{309397BE-D476-D644-AA3D-214C3A4FE062}" sibTransId="{58C1B60A-0535-D743-BD7B-9FB8FA19DE32}"/>
-    <dgm:cxn modelId="{680D9BD0-59D6-BA43-A04C-84DF09D16019}" type="presOf" srcId="{10FFF7CE-2BCF-C148-949B-0FAF0DAD97AA}" destId="{276AE207-F6BE-884E-8A30-2C04B02D3BF1}" srcOrd="0" destOrd="0" presId="urn:microsoft.com/office/officeart/2005/8/layout/process5"/>
-    <dgm:cxn modelId="{C32EE3F2-254B-5D47-99A6-89E1AD84DDF2}" type="presOf" srcId="{C61FD49E-4016-B540-890A-B9DD3C4CAEFC}" destId="{5AF6E921-B27B-AD46-BAF4-57FF3C7B6F6F}" srcOrd="0" destOrd="0" presId="urn:microsoft.com/office/officeart/2005/8/layout/process5"/>
-    <dgm:cxn modelId="{82310679-4E1D-4C40-AB27-B13CDFFEB237}" type="presOf" srcId="{D735D768-D29C-964B-BFD8-7EB3F824FD3F}" destId="{55E31240-2723-FA44-BC34-9330C946D4B4}" srcOrd="0" destOrd="0" presId="urn:microsoft.com/office/officeart/2005/8/layout/process5"/>
-    <dgm:cxn modelId="{54655204-F7B4-C54F-B7D9-A566684803BC}" type="presOf" srcId="{2CC926CB-D1CC-4A4D-8E4C-9319F5E1944C}" destId="{D798B5E6-7301-A74F-BAFA-138AFB665563}" srcOrd="1" destOrd="0" presId="urn:microsoft.com/office/officeart/2005/8/layout/process5"/>
-    <dgm:cxn modelId="{06A56380-2B89-D740-A803-A23985CEA75A}" srcId="{10FFF7CE-2BCF-C148-949B-0FAF0DAD97AA}" destId="{C61FD49E-4016-B540-890A-B9DD3C4CAEFC}" srcOrd="0" destOrd="0" parTransId="{F42F14E0-A406-884A-9B92-F2FE477E8461}" sibTransId="{2CC926CB-D1CC-4A4D-8E4C-9319F5E1944C}"/>
     <dgm:cxn modelId="{931EF385-A03E-4345-9F29-9C41C589A54D}" type="presParOf" srcId="{276AE207-F6BE-884E-8A30-2C04B02D3BF1}" destId="{5AF6E921-B27B-AD46-BAF4-57FF3C7B6F6F}" srcOrd="0" destOrd="0" presId="urn:microsoft.com/office/officeart/2005/8/layout/process5"/>
     <dgm:cxn modelId="{500ADEEF-81FC-5C4B-9F7F-563922E022DA}" type="presParOf" srcId="{276AE207-F6BE-884E-8A30-2C04B02D3BF1}" destId="{00D0904F-F387-3645-97F8-595C14055D1D}" srcOrd="1" destOrd="0" presId="urn:microsoft.com/office/officeart/2005/8/layout/process5"/>
     <dgm:cxn modelId="{EE7A8C94-69AB-0942-A2AB-70A262CB825D}" type="presParOf" srcId="{00D0904F-F387-3645-97F8-595C14055D1D}" destId="{D798B5E6-7301-A74F-BAFA-138AFB665563}" srcOrd="0" destOrd="0" presId="urn:microsoft.com/office/officeart/2005/8/layout/process5"/>
@@ -3601,25 +3599,8 @@
             </a:spcAft>
           </a:pPr>
           <a:r>
-            <a:rPr lang="en-US" sz="2300" b="0" i="0" kern="1200" baseline="0" dirty="0"/>
-            <a:t>Train test split &amp;</a:t>
-          </a:r>
-        </a:p>
-        <a:p>
-          <a:pPr lvl="0" algn="ctr" defTabSz="1022350">
-            <a:lnSpc>
-              <a:spcPct val="90000"/>
-            </a:lnSpc>
-            <a:spcBef>
-              <a:spcPct val="0"/>
-            </a:spcBef>
-            <a:spcAft>
-              <a:spcPct val="35000"/>
-            </a:spcAft>
-          </a:pPr>
-          <a:r>
-            <a:rPr lang="en-US" sz="2300" b="0" i="0" kern="1200" baseline="0" dirty="0"/>
-            <a:t>Under Sampling</a:t>
+            <a:rPr lang="en-US" sz="2300" b="0" i="0" kern="1200" baseline="0" dirty="0" smtClean="0"/>
+            <a:t>Over Sampling (SMOTE)</a:t>
           </a:r>
           <a:endParaRPr lang="en-US" sz="2300" kern="1200" dirty="0"/>
         </a:p>
@@ -4151,7 +4132,28 @@
           </a:pPr>
           <a:r>
             <a:rPr lang="en-US" sz="2400" kern="1200" dirty="0" smtClean="0"/>
-            <a:t>Consumer Narrative Column</a:t>
+            <a:t>Consumer Narrative </a:t>
+          </a:r>
+          <a:r>
+            <a:rPr lang="en-US" sz="2400" kern="1200" dirty="0" smtClean="0"/>
+            <a:t>Column</a:t>
+          </a:r>
+        </a:p>
+        <a:p>
+          <a:pPr lvl="0" algn="ctr" defTabSz="1066800">
+            <a:lnSpc>
+              <a:spcPct val="90000"/>
+            </a:lnSpc>
+            <a:spcBef>
+              <a:spcPct val="0"/>
+            </a:spcBef>
+            <a:spcAft>
+              <a:spcPct val="35000"/>
+            </a:spcAft>
+          </a:pPr>
+          <a:r>
+            <a:rPr lang="en-US" sz="2400" kern="1200" dirty="0" smtClean="0"/>
+            <a:t>Train Test Split</a:t>
           </a:r>
           <a:endParaRPr lang="en-US" sz="2400" kern="1200" dirty="0"/>
         </a:p>
@@ -9591,10 +9593,10 @@
           <a:lstStyle/>
           <a:p>
             <a:r>
-              <a:rPr lang="en-US" sz="4800" b="1"/>
+              <a:rPr lang="en-US" sz="4800" b="1" dirty="0"/>
               <a:t>A STUDY ON FINANCIAL PRODUCT CONSUMER COMPLAINTS </a:t>
             </a:r>
-            <a:endParaRPr lang="en-US" sz="4800">
+            <a:endParaRPr lang="en-US" sz="4800" dirty="0">
               <a:effectLst/>
             </a:endParaRPr>
           </a:p>
@@ -11622,7 +11624,7 @@
               <p:cNvPr id="6" name="Diagram 5">
                 <a:extLst>
                   <a:ext uri="{FF2B5EF4-FFF2-40B4-BE49-F238E27FC236}">
-                    <a16:creationId xmlns="" xmlns:a16="http://schemas.microsoft.com/office/drawing/2014/main" id="{545728AE-A1E9-E84A-9E4D-5E96CD8AC2C8}"/>
+                    <a16:creationId xmlns:a16="http://schemas.microsoft.com/office/drawing/2014/main" xmlns="" id="{545728AE-A1E9-E84A-9E4D-5E96CD8AC2C8}"/>
                   </a:ext>
                 </a:extLst>
               </p:cNvPr>
@@ -11630,7 +11632,7 @@
               <p:nvPr>
                 <p:extLst>
                   <p:ext uri="{D42A27DB-BD31-4B8C-83A1-F6EECF244321}">
-                    <p14:modId xmlns:p14="http://schemas.microsoft.com/office/powerpoint/2010/main" val="1771732043"/>
+                    <p14:modId xmlns:p14="http://schemas.microsoft.com/office/powerpoint/2010/main" val="1751111464"/>
                   </p:ext>
                 </p:extLst>
               </p:nvPr>
@@ -11652,7 +11654,7 @@
               <p:cNvPr id="6" name="Diagram 5">
                 <a:extLst>
                   <a:ext uri="{FF2B5EF4-FFF2-40B4-BE49-F238E27FC236}">
-                    <a16:creationId xmlns="" xmlns:a16="http://schemas.microsoft.com/office/drawing/2014/main" xmlns:a14="http://schemas.microsoft.com/office/drawing/2010/main" id="{545728AE-A1E9-E84A-9E4D-5E96CD8AC2C8}"/>
+                    <a16:creationId xmlns:a16="http://schemas.microsoft.com/office/drawing/2014/main" xmlns="" xmlns:a14="http://schemas.microsoft.com/office/drawing/2010/main" id="{545728AE-A1E9-E84A-9E4D-5E96CD8AC2C8}"/>
                   </a:ext>
                 </a:extLst>
               </p:cNvPr>
@@ -11660,7 +11662,7 @@
               <p:nvPr>
                 <p:extLst>
                   <p:ext uri="{D42A27DB-BD31-4B8C-83A1-F6EECF244321}">
-                    <p14:modId xmlns:p14="http://schemas.microsoft.com/office/powerpoint/2010/main" val="1771732043"/>
+                    <p14:modId xmlns:p14="http://schemas.microsoft.com/office/powerpoint/2010/main" val="1751111464"/>
                   </p:ext>
                 </p:extLst>
               </p:nvPr>
@@ -11682,7 +11684,7 @@
           <p:cNvPr id="13" name="Rectangle 12">
             <a:extLst>
               <a:ext uri="{FF2B5EF4-FFF2-40B4-BE49-F238E27FC236}">
-                <a16:creationId xmlns="" xmlns:a16="http://schemas.microsoft.com/office/drawing/2014/main" id="{D0067DA0-FD53-7F4E-B9AB-B25125AE8508}"/>
+                <a16:creationId xmlns:a16="http://schemas.microsoft.com/office/drawing/2014/main" xmlns="" id="{D0067DA0-FD53-7F4E-B9AB-B25125AE8508}"/>
               </a:ext>
             </a:extLst>
           </p:cNvPr>
@@ -11765,7 +11767,7 @@
           <p:cNvPr id="5" name="Title 1">
             <a:extLst>
               <a:ext uri="{FF2B5EF4-FFF2-40B4-BE49-F238E27FC236}">
-                <a16:creationId xmlns="" xmlns:a16="http://schemas.microsoft.com/office/drawing/2014/main" id="{723F73D7-94BA-D349-B8A6-66EC2012A0AF}"/>
+                <a16:creationId xmlns:a16="http://schemas.microsoft.com/office/drawing/2014/main" xmlns="" id="{723F73D7-94BA-D349-B8A6-66EC2012A0AF}"/>
               </a:ext>
             </a:extLst>
           </p:cNvPr>
@@ -12082,7 +12084,7 @@
           <p:cNvPr id="10" name="Group 9">
             <a:extLst>
               <a:ext uri="{FF2B5EF4-FFF2-40B4-BE49-F238E27FC236}">
-                <a16:creationId xmlns="" xmlns:a16="http://schemas.microsoft.com/office/drawing/2014/main" id="{788CD22D-3046-EC43-BFBA-2CCA29259BEF}"/>
+                <a16:creationId xmlns:a16="http://schemas.microsoft.com/office/drawing/2014/main" xmlns="" id="{788CD22D-3046-EC43-BFBA-2CCA29259BEF}"/>
               </a:ext>
             </a:extLst>
           </p:cNvPr>
@@ -12102,7 +12104,7 @@
             <p:cNvPr id="11" name="Right Arrow 10">
               <a:extLst>
                 <a:ext uri="{FF2B5EF4-FFF2-40B4-BE49-F238E27FC236}">
-                  <a16:creationId xmlns="" xmlns:a16="http://schemas.microsoft.com/office/drawing/2014/main" id="{4B3F69FE-93EA-AE44-AD1D-745E293E7160}"/>
+                  <a16:creationId xmlns:a16="http://schemas.microsoft.com/office/drawing/2014/main" xmlns="" id="{4B3F69FE-93EA-AE44-AD1D-745E293E7160}"/>
                 </a:ext>
               </a:extLst>
             </p:cNvPr>
@@ -12166,7 +12168,7 @@
             <p:cNvPr id="12" name="Right Arrow 4">
               <a:extLst>
                 <a:ext uri="{FF2B5EF4-FFF2-40B4-BE49-F238E27FC236}">
-                  <a16:creationId xmlns="" xmlns:a16="http://schemas.microsoft.com/office/drawing/2014/main" id="{AAFF5045-DAE2-D745-8023-11B47253ACEC}"/>
+                  <a16:creationId xmlns:a16="http://schemas.microsoft.com/office/drawing/2014/main" xmlns="" id="{AAFF5045-DAE2-D745-8023-11B47253ACEC}"/>
                 </a:ext>
               </a:extLst>
             </p:cNvPr>
@@ -12224,7 +12226,7 @@
           <p:cNvPr id="14" name="TextBox 13">
             <a:extLst>
               <a:ext uri="{FF2B5EF4-FFF2-40B4-BE49-F238E27FC236}">
-                <a16:creationId xmlns="" xmlns:a16="http://schemas.microsoft.com/office/drawing/2014/main" id="{1DF5F298-0E7E-2F4A-81A7-BD4C569B96AF}"/>
+                <a16:creationId xmlns:a16="http://schemas.microsoft.com/office/drawing/2014/main" xmlns="" id="{1DF5F298-0E7E-2F4A-81A7-BD4C569B96AF}"/>
               </a:ext>
             </a:extLst>
           </p:cNvPr>
@@ -12306,7 +12308,7 @@
           <p:cNvPr id="9" name="Diagram 8">
             <a:extLst>
               <a:ext uri="{FF2B5EF4-FFF2-40B4-BE49-F238E27FC236}">
-                <a16:creationId xmlns="" xmlns:a16="http://schemas.microsoft.com/office/drawing/2014/main" xmlns:a14="http://schemas.microsoft.com/office/drawing/2010/main" xmlns:mc="http://schemas.openxmlformats.org/markup-compatibility/2006" id="{545728AE-A1E9-E84A-9E4D-5E96CD8AC2C8}"/>
+                <a16:creationId xmlns:mc="http://schemas.openxmlformats.org/markup-compatibility/2006" xmlns:a14="http://schemas.microsoft.com/office/drawing/2010/main" xmlns:a16="http://schemas.microsoft.com/office/drawing/2014/main" xmlns="" id="{545728AE-A1E9-E84A-9E4D-5E96CD8AC2C8}"/>
               </a:ext>
             </a:extLst>
           </p:cNvPr>
@@ -12314,7 +12316,7 @@
           <p:nvPr>
             <p:extLst>
               <p:ext uri="{D42A27DB-BD31-4B8C-83A1-F6EECF244321}">
-                <p14:modId xmlns:p14="http://schemas.microsoft.com/office/powerpoint/2010/main" val="300712717"/>
+                <p14:modId xmlns:p14="http://schemas.microsoft.com/office/powerpoint/2010/main" val="47746100"/>
               </p:ext>
             </p:extLst>
           </p:nvPr>
@@ -12334,7 +12336,7 @@
           <p:cNvPr id="15" name="Group 14">
             <a:extLst>
               <a:ext uri="{FF2B5EF4-FFF2-40B4-BE49-F238E27FC236}">
-                <a16:creationId xmlns="" xmlns:a16="http://schemas.microsoft.com/office/drawing/2014/main" id="{788CD22D-3046-EC43-BFBA-2CCA29259BEF}"/>
+                <a16:creationId xmlns:a16="http://schemas.microsoft.com/office/drawing/2014/main" xmlns="" id="{788CD22D-3046-EC43-BFBA-2CCA29259BEF}"/>
               </a:ext>
             </a:extLst>
           </p:cNvPr>
@@ -12354,7 +12356,7 @@
             <p:cNvPr id="16" name="Right Arrow 15">
               <a:extLst>
                 <a:ext uri="{FF2B5EF4-FFF2-40B4-BE49-F238E27FC236}">
-                  <a16:creationId xmlns="" xmlns:a16="http://schemas.microsoft.com/office/drawing/2014/main" id="{4B3F69FE-93EA-AE44-AD1D-745E293E7160}"/>
+                  <a16:creationId xmlns:a16="http://schemas.microsoft.com/office/drawing/2014/main" xmlns="" id="{4B3F69FE-93EA-AE44-AD1D-745E293E7160}"/>
                 </a:ext>
               </a:extLst>
             </p:cNvPr>
@@ -12418,7 +12420,7 @@
             <p:cNvPr id="17" name="Right Arrow 4">
               <a:extLst>
                 <a:ext uri="{FF2B5EF4-FFF2-40B4-BE49-F238E27FC236}">
-                  <a16:creationId xmlns="" xmlns:a16="http://schemas.microsoft.com/office/drawing/2014/main" id="{AAFF5045-DAE2-D745-8023-11B47253ACEC}"/>
+                  <a16:creationId xmlns:a16="http://schemas.microsoft.com/office/drawing/2014/main" xmlns="" id="{AAFF5045-DAE2-D745-8023-11B47253ACEC}"/>
                 </a:ext>
               </a:extLst>
             </p:cNvPr>
@@ -12476,7 +12478,7 @@
           <p:cNvPr id="18" name="Rectangle 17">
             <a:extLst>
               <a:ext uri="{FF2B5EF4-FFF2-40B4-BE49-F238E27FC236}">
-                <a16:creationId xmlns="" xmlns:a16="http://schemas.microsoft.com/office/drawing/2014/main" id="{D0067DA0-FD53-7F4E-B9AB-B25125AE8508}"/>
+                <a16:creationId xmlns:a16="http://schemas.microsoft.com/office/drawing/2014/main" xmlns="" id="{D0067DA0-FD53-7F4E-B9AB-B25125AE8508}"/>
               </a:ext>
             </a:extLst>
           </p:cNvPr>
@@ -12559,7 +12561,7 @@
           <p:cNvPr id="19" name="TextBox 18">
             <a:extLst>
               <a:ext uri="{FF2B5EF4-FFF2-40B4-BE49-F238E27FC236}">
-                <a16:creationId xmlns="" xmlns:a16="http://schemas.microsoft.com/office/drawing/2014/main" id="{1DF5F298-0E7E-2F4A-81A7-BD4C569B96AF}"/>
+                <a16:creationId xmlns:a16="http://schemas.microsoft.com/office/drawing/2014/main" xmlns="" id="{1DF5F298-0E7E-2F4A-81A7-BD4C569B96AF}"/>
               </a:ext>
             </a:extLst>
           </p:cNvPr>
@@ -12686,7 +12688,7 @@
           <p:cNvPr id="5" name="Title 1">
             <a:extLst>
               <a:ext uri="{FF2B5EF4-FFF2-40B4-BE49-F238E27FC236}">
-                <a16:creationId xmlns="" xmlns:a16="http://schemas.microsoft.com/office/drawing/2014/main" id="{723F73D7-94BA-D349-B8A6-66EC2012A0AF}"/>
+                <a16:creationId xmlns:a16="http://schemas.microsoft.com/office/drawing/2014/main" xmlns="" id="{723F73D7-94BA-D349-B8A6-66EC2012A0AF}"/>
               </a:ext>
             </a:extLst>
           </p:cNvPr>
@@ -13353,6 +13355,13 @@
     <a:masterClrMapping/>
   </p:clrMapOvr>
   <p:transition spd="med"/>
+  <p:timing>
+    <p:tnLst>
+      <p:par>
+        <p:cTn id="1" dur="indefinite" restart="never" nodeType="tmRoot"/>
+      </p:par>
+    </p:tnLst>
+  </p:timing>
 </p:sld>
 </file>
 
@@ -13373,6 +13382,36 @@
           <a:chExt cx="0" cy="0"/>
         </a:xfrm>
       </p:grpSpPr>
+      <p:pic>
+        <p:nvPicPr>
+          <p:cNvPr id="3" name="Picture 2"/>
+          <p:cNvPicPr>
+            <a:picLocks noChangeAspect="1"/>
+          </p:cNvPicPr>
+          <p:nvPr/>
+        </p:nvPicPr>
+        <p:blipFill>
+          <a:blip r:embed="rId3">
+            <a:extLst>
+              <a:ext uri="{28A0092B-C50C-407E-A947-70E740481C1C}">
+                <a14:useLocalDpi xmlns:a14="http://schemas.microsoft.com/office/drawing/2010/main" val="0"/>
+              </a:ext>
+            </a:extLst>
+          </a:blip>
+          <a:stretch>
+            <a:fillRect/>
+          </a:stretch>
+        </p:blipFill>
+        <p:spPr>
+          <a:xfrm>
+            <a:off x="167528" y="4836598"/>
+            <a:ext cx="6556002" cy="4917002"/>
+          </a:xfrm>
+          <a:prstGeom prst="rect">
+            <a:avLst/>
+          </a:prstGeom>
+        </p:spPr>
+      </p:pic>
       <p:sp>
         <p:nvSpPr>
           <p:cNvPr id="4" name="Title 1"/>
@@ -13680,7 +13719,7 @@
           <p:cNvPr id="7" name="Table 6">
             <a:extLst>
               <a:ext uri="{FF2B5EF4-FFF2-40B4-BE49-F238E27FC236}">
-                <a16:creationId xmlns="" xmlns:a16="http://schemas.microsoft.com/office/drawing/2014/main" id="{89B948E0-6845-AF4D-AB1F-7A2FB2802D89}"/>
+                <a16:creationId xmlns:a16="http://schemas.microsoft.com/office/drawing/2014/main" xmlns="" id="{89B948E0-6845-AF4D-AB1F-7A2FB2802D89}"/>
               </a:ext>
             </a:extLst>
           </p:cNvPr>
@@ -13690,14 +13729,14 @@
           <p:nvPr>
             <p:extLst>
               <p:ext uri="{D42A27DB-BD31-4B8C-83A1-F6EECF244321}">
-                <p14:modId xmlns:p14="http://schemas.microsoft.com/office/powerpoint/2010/main" val="1834830176"/>
+                <p14:modId xmlns:p14="http://schemas.microsoft.com/office/powerpoint/2010/main" val="1758776729"/>
               </p:ext>
             </p:extLst>
           </p:nvPr>
         </p:nvGraphicFramePr>
         <p:xfrm>
-          <a:off x="361950" y="1958249"/>
-          <a:ext cx="6080814" cy="3045409"/>
+          <a:off x="361950" y="1793176"/>
+          <a:ext cx="6080814" cy="3292889"/>
         </p:xfrm>
         <a:graphic>
           <a:graphicData uri="http://schemas.openxmlformats.org/drawingml/2006/table">
@@ -13709,21 +13748,21 @@
                 <a:gridCol w="2026938">
                   <a:extLst>
                     <a:ext uri="{9D8B030D-6E8A-4147-A177-3AD203B41FA5}">
-                      <a16:colId xmlns="" xmlns:a16="http://schemas.microsoft.com/office/drawing/2014/main" val="2598288907"/>
+                      <a16:colId xmlns:a16="http://schemas.microsoft.com/office/drawing/2014/main" xmlns="" val="2598288907"/>
                     </a:ext>
                   </a:extLst>
                 </a:gridCol>
                 <a:gridCol w="2026938">
                   <a:extLst>
                     <a:ext uri="{9D8B030D-6E8A-4147-A177-3AD203B41FA5}">
-                      <a16:colId xmlns="" xmlns:a16="http://schemas.microsoft.com/office/drawing/2014/main" val="522738282"/>
+                      <a16:colId xmlns:a16="http://schemas.microsoft.com/office/drawing/2014/main" xmlns="" val="522738282"/>
                     </a:ext>
                   </a:extLst>
                 </a:gridCol>
                 <a:gridCol w="2026938">
                   <a:extLst>
                     <a:ext uri="{9D8B030D-6E8A-4147-A177-3AD203B41FA5}">
-                      <a16:colId xmlns="" xmlns:a16="http://schemas.microsoft.com/office/drawing/2014/main" val="2207412083"/>
+                      <a16:colId xmlns:a16="http://schemas.microsoft.com/office/drawing/2014/main" xmlns="" val="2207412083"/>
                     </a:ext>
                   </a:extLst>
                 </a:gridCol>
@@ -13787,7 +13826,7 @@
                 </a:tc>
                 <a:extLst>
                   <a:ext uri="{0D108BD9-81ED-4DB2-BD59-A6C34878D82A}">
-                    <a16:rowId xmlns="" xmlns:a16="http://schemas.microsoft.com/office/drawing/2014/main" val="2574787134"/>
+                    <a16:rowId xmlns:a16="http://schemas.microsoft.com/office/drawing/2014/main" xmlns="" val="2574787134"/>
                   </a:ext>
                 </a:extLst>
               </a:tr>
@@ -13827,7 +13866,7 @@
                     <a:p>
                       <a:r>
                         <a:rPr lang="en-US" sz="1800" dirty="0" smtClean="0"/>
-                        <a:t>0.55</a:t>
+                        <a:t>0.63</a:t>
                       </a:r>
                       <a:endParaRPr lang="en-US" sz="1800" dirty="0"/>
                     </a:p>
@@ -13836,7 +13875,7 @@
                 </a:tc>
                 <a:extLst>
                   <a:ext uri="{0D108BD9-81ED-4DB2-BD59-A6C34878D82A}">
-                    <a16:rowId xmlns="" xmlns:a16="http://schemas.microsoft.com/office/drawing/2014/main" val="1435507703"/>
+                    <a16:rowId xmlns:a16="http://schemas.microsoft.com/office/drawing/2014/main" xmlns="" val="1435507703"/>
                   </a:ext>
                 </a:extLst>
               </a:tr>
@@ -13861,7 +13900,7 @@
                     <a:p>
                       <a:r>
                         <a:rPr lang="en-US" sz="1800" dirty="0" smtClean="0"/>
-                        <a:t>0.62</a:t>
+                        <a:t>0.83</a:t>
                       </a:r>
                       <a:endParaRPr lang="en-US" sz="1800" dirty="0"/>
                     </a:p>
@@ -13875,7 +13914,7 @@
                     <a:p>
                       <a:r>
                         <a:rPr lang="en-US" sz="1800" dirty="0" smtClean="0"/>
-                        <a:t>0.61</a:t>
+                        <a:t>0.79</a:t>
                       </a:r>
                       <a:endParaRPr lang="en-US" sz="1800" dirty="0"/>
                     </a:p>
@@ -13884,11 +13923,11 @@
                 </a:tc>
                 <a:extLst>
                   <a:ext uri="{0D108BD9-81ED-4DB2-BD59-A6C34878D82A}">
-                    <a16:rowId xmlns="" xmlns:a16="http://schemas.microsoft.com/office/drawing/2014/main" val="2288519936"/>
+                    <a16:rowId xmlns:a16="http://schemas.microsoft.com/office/drawing/2014/main" xmlns="" val="2288519936"/>
                   </a:ext>
                 </a:extLst>
               </a:tr>
-              <a:tr h="423106">
+              <a:tr h="887560">
                 <a:tc>
                   <a:txBody>
                     <a:bodyPr/>
@@ -13914,7 +13953,7 @@
                     <a:p>
                       <a:r>
                         <a:rPr lang="en-US" sz="1800" dirty="0" smtClean="0"/>
-                        <a:t>0.62</a:t>
+                        <a:t>0.69</a:t>
                       </a:r>
                       <a:endParaRPr lang="en-US" sz="1800" dirty="0"/>
                     </a:p>
@@ -13928,7 +13967,7 @@
                     <a:p>
                       <a:r>
                         <a:rPr lang="en-US" sz="1800" dirty="0" smtClean="0"/>
-                        <a:t>0.61</a:t>
+                        <a:t>0.78</a:t>
                       </a:r>
                       <a:endParaRPr lang="en-US" sz="1800" dirty="0"/>
                     </a:p>
@@ -13937,7 +13976,7 @@
                 </a:tc>
                 <a:extLst>
                   <a:ext uri="{0D108BD9-81ED-4DB2-BD59-A6C34878D82A}">
-                    <a16:rowId xmlns="" xmlns:a16="http://schemas.microsoft.com/office/drawing/2014/main" val="4024914912"/>
+                    <a16:rowId xmlns:a16="http://schemas.microsoft.com/office/drawing/2014/main" xmlns="" val="4024914912"/>
                   </a:ext>
                 </a:extLst>
               </a:tr>
@@ -13963,7 +14002,7 @@
                     <a:p>
                       <a:r>
                         <a:rPr lang="en-US" sz="1800" dirty="0" smtClean="0"/>
-                        <a:t>0.60</a:t>
+                        <a:t>0.83</a:t>
                       </a:r>
                       <a:endParaRPr lang="en-US" sz="1800" dirty="0"/>
                     </a:p>
@@ -13977,7 +14016,7 @@
                     <a:p>
                       <a:r>
                         <a:rPr lang="en-US" sz="1800" dirty="0" smtClean="0"/>
-                        <a:t>0.60</a:t>
+                        <a:t>0.77</a:t>
                       </a:r>
                       <a:endParaRPr lang="en-US" sz="1800" dirty="0"/>
                     </a:p>
@@ -13986,7 +14025,7 @@
                 </a:tc>
                 <a:extLst>
                   <a:ext uri="{0D108BD9-81ED-4DB2-BD59-A6C34878D82A}">
-                    <a16:rowId xmlns="" xmlns:a16="http://schemas.microsoft.com/office/drawing/2014/main" val="1533939965"/>
+                    <a16:rowId xmlns:a16="http://schemas.microsoft.com/office/drawing/2014/main" xmlns="" val="1533939965"/>
                   </a:ext>
                 </a:extLst>
               </a:tr>
@@ -13999,7 +14038,7 @@
           <p:cNvPr id="8" name="5-Point Star 7">
             <a:extLst>
               <a:ext uri="{FF2B5EF4-FFF2-40B4-BE49-F238E27FC236}">
-                <a16:creationId xmlns="" xmlns:a16="http://schemas.microsoft.com/office/drawing/2014/main" id="{69FD48A5-3E69-3341-A858-C0232448E778}"/>
+                <a16:creationId xmlns:a16="http://schemas.microsoft.com/office/drawing/2014/main" xmlns="" id="{69FD48A5-3E69-3341-A858-C0232448E778}"/>
               </a:ext>
             </a:extLst>
           </p:cNvPr>
@@ -14008,7 +14047,7 @@
         </p:nvSpPr>
         <p:spPr>
           <a:xfrm rot="20006097">
-            <a:off x="-47625" y="3953290"/>
+            <a:off x="-101414" y="3134820"/>
             <a:ext cx="609600" cy="609600"/>
           </a:xfrm>
           <a:prstGeom prst="star5">
@@ -14080,7 +14119,7 @@
           <p:cNvPr id="9" name="Rectangle 8">
             <a:extLst>
               <a:ext uri="{FF2B5EF4-FFF2-40B4-BE49-F238E27FC236}">
-                <a16:creationId xmlns="" xmlns:a16="http://schemas.microsoft.com/office/drawing/2014/main" id="{80E9E449-31A7-D840-B1B5-864BBD5E5369}"/>
+                <a16:creationId xmlns:a16="http://schemas.microsoft.com/office/drawing/2014/main" xmlns="" id="{80E9E449-31A7-D840-B1B5-864BBD5E5369}"/>
               </a:ext>
             </a:extLst>
           </p:cNvPr>
@@ -14090,7 +14129,7 @@
         <p:spPr>
           <a:xfrm>
             <a:off x="6442764" y="1025558"/>
-            <a:ext cx="6562036" cy="8858835"/>
+            <a:ext cx="6562036" cy="8489504"/>
           </a:xfrm>
           <a:prstGeom prst="rect">
             <a:avLst/>
@@ -14112,7 +14151,15 @@
             </a:pPr>
             <a:r>
               <a:rPr lang="en-US" dirty="0" smtClean="0"/>
-              <a:t>Logistic regression classifier </a:t>
+              <a:t>Random </a:t>
+            </a:r>
+            <a:r>
+              <a:rPr lang="en-US" dirty="0" err="1" smtClean="0"/>
+              <a:t>Rorestclassifier</a:t>
+            </a:r>
+            <a:r>
+              <a:rPr lang="en-US" dirty="0" smtClean="0"/>
+              <a:t> </a:t>
             </a:r>
             <a:r>
               <a:rPr lang="en-US" b="0" dirty="0" smtClean="0"/>
@@ -14124,7 +14171,7 @@
             </a:r>
             <a:r>
               <a:rPr lang="en-US" b="0" dirty="0" smtClean="0"/>
-              <a:t>0.62 </a:t>
+              <a:t>0.79 </a:t>
             </a:r>
             <a:r>
               <a:rPr lang="en-US" b="0" dirty="0"/>
@@ -14185,6 +14232,56 @@
             <a:r>
               <a:rPr lang="en-US" b="0" dirty="0"/>
               <a:t>indicates similar result.</a:t>
+            </a:r>
+          </a:p>
+          <a:p>
+            <a:pPr marL="444500" indent="-444500" algn="l">
+              <a:spcBef>
+                <a:spcPts val="1000"/>
+              </a:spcBef>
+              <a:buSzPct val="145000"/>
+              <a:buFontTx/>
+              <a:buChar char="•"/>
+            </a:pPr>
+            <a:r>
+              <a:rPr lang="en-US" b="0" dirty="0"/>
+              <a:t>From the </a:t>
+            </a:r>
+            <a:r>
+              <a:rPr lang="en-US" b="0" dirty="0" smtClean="0"/>
+              <a:t>feature importance plot</a:t>
+            </a:r>
+            <a:r>
+              <a:rPr lang="en-US" b="0" dirty="0" smtClean="0"/>
+              <a:t>, </a:t>
+            </a:r>
+            <a:r>
+              <a:rPr lang="en-US" b="0" dirty="0" smtClean="0"/>
+              <a:t>the </a:t>
+            </a:r>
+            <a:r>
+              <a:rPr lang="en-US" b="0" dirty="0"/>
+              <a:t>top </a:t>
+            </a:r>
+            <a:r>
+              <a:rPr lang="en-US" b="0" dirty="0" smtClean="0"/>
+              <a:t>3 </a:t>
+            </a:r>
+            <a:r>
+              <a:rPr lang="en-US" b="0" dirty="0"/>
+              <a:t>attributes positively contributing </a:t>
+            </a:r>
+            <a:r>
+              <a:rPr lang="en-US" b="0" dirty="0" smtClean="0"/>
+              <a:t>being disputed includes </a:t>
+            </a:r>
+            <a:r>
+              <a:rPr lang="en-US" b="0" dirty="0" smtClean="0"/>
+              <a:t>company responses and year</a:t>
+            </a:r>
+            <a:r>
+              <a:rPr lang="en-US" b="0" dirty="0" smtClean="0"/>
+              <a:t>.</a:t>
             </a:r>
             <a:endParaRPr lang="en-US" b="0" dirty="0"/>
           </a:p>
@@ -14198,42 +14295,25 @@
               <a:buChar char="•"/>
             </a:pPr>
             <a:r>
-              <a:rPr lang="en-US" b="0" dirty="0"/>
-              <a:t>From the coefficients of attributes by logistic regression, </a:t>
-            </a:r>
-            <a:r>
               <a:rPr lang="en-US" b="0" dirty="0" smtClean="0"/>
-              <a:t>the </a:t>
-            </a:r>
-            <a:r>
-              <a:rPr lang="en-US" b="0" dirty="0"/>
-              <a:t>top </a:t>
+              <a:t>Logistic regression gives the </a:t>
+            </a:r>
+            <a:r>
+              <a:rPr lang="en-US" dirty="0" smtClean="0"/>
+              <a:t>recall score </a:t>
             </a:r>
             <a:r>
               <a:rPr lang="en-US" b="0" dirty="0" smtClean="0"/>
-              <a:t>3 </a:t>
-            </a:r>
-            <a:r>
-              <a:rPr lang="en-US" b="0" dirty="0"/>
-              <a:t>attributes positively contributing </a:t>
+              <a:t>for dispute </a:t>
             </a:r>
             <a:r>
               <a:rPr lang="en-US" b="0" dirty="0" smtClean="0"/>
-              <a:t>being disputed includes </a:t>
-            </a:r>
-            <a:r>
-              <a:rPr lang="en-US" dirty="0" smtClean="0"/>
-              <a:t>Scottrade Bank, </a:t>
-            </a:r>
-            <a:r>
-              <a:rPr lang="en-US" dirty="0"/>
-              <a:t>Equifax and VIOLATION</a:t>
+              <a:t>at 0.55, </a:t>
             </a:r>
             <a:r>
               <a:rPr lang="en-US" b="0" dirty="0" smtClean="0"/>
-              <a:t>:.</a:t>
-            </a:r>
-            <a:endParaRPr lang="en-US" b="0" dirty="0"/>
+              <a:t>higher than the average accuracy score. It presents the ability for the model to detect target.   </a:t>
+            </a:r>
           </a:p>
           <a:p>
             <a:pPr marL="444500" indent="-444500" algn="l">
@@ -14246,72 +14326,12 @@
             </a:pPr>
             <a:r>
               <a:rPr lang="en-US" b="0" dirty="0" smtClean="0"/>
-              <a:t>Logistic regressio</a:t>
-            </a:r>
-            <a:r>
-              <a:rPr lang="en-US" b="0" dirty="0" smtClean="0"/>
-              <a:t>n gives t</a:t>
-            </a:r>
-            <a:r>
-              <a:rPr lang="en-US" b="0" dirty="0" smtClean="0"/>
-              <a:t>he </a:t>
-            </a:r>
-            <a:r>
-              <a:rPr lang="en-US" dirty="0" smtClean="0"/>
-              <a:t>recall score </a:t>
-            </a:r>
-            <a:r>
-              <a:rPr lang="en-US" b="0" dirty="0" smtClean="0"/>
-              <a:t>for dispute at 0.65, higher than the average accuracy score. It presents the ability for the model to detect target.   </a:t>
-            </a:r>
-          </a:p>
-          <a:p>
-            <a:pPr marL="444500" indent="-444500" algn="l">
-              <a:spcBef>
-                <a:spcPts val="1000"/>
-              </a:spcBef>
-              <a:buSzPct val="145000"/>
-              <a:buFontTx/>
-              <a:buChar char="•"/>
-            </a:pPr>
-            <a:r>
-              <a:rPr lang="en-US" b="0" dirty="0" smtClean="0"/>
               <a:t>It seems that there is generally a weak correlation between the target feature and the rest of the data. </a:t>
             </a:r>
             <a:endParaRPr lang="en-US" b="0" dirty="0"/>
           </a:p>
         </p:txBody>
       </p:sp>
-      <p:pic>
-        <p:nvPicPr>
-          <p:cNvPr id="2" name="Picture 1"/>
-          <p:cNvPicPr>
-            <a:picLocks noChangeAspect="1"/>
-          </p:cNvPicPr>
-          <p:nvPr/>
-        </p:nvPicPr>
-        <p:blipFill>
-          <a:blip r:embed="rId3">
-            <a:extLst>
-              <a:ext uri="{28A0092B-C50C-407E-A947-70E740481C1C}">
-                <a14:useLocalDpi xmlns:a14="http://schemas.microsoft.com/office/drawing/2010/main" val="0"/>
-              </a:ext>
-            </a:extLst>
-          </a:blip>
-          <a:stretch>
-            <a:fillRect/>
-          </a:stretch>
-        </p:blipFill>
-        <p:spPr>
-          <a:xfrm>
-            <a:off x="361950" y="5142190"/>
-            <a:ext cx="6080814" cy="4560611"/>
-          </a:xfrm>
-          <a:prstGeom prst="rect">
-            <a:avLst/>
-          </a:prstGeom>
-        </p:spPr>
-      </p:pic>
     </p:spTree>
     <p:extLst>
       <p:ext uri="{BB962C8B-B14F-4D97-AF65-F5344CB8AC3E}">
@@ -14415,7 +14435,7 @@
           <p:cNvPr id="2" name="Title 1">
             <a:extLst>
               <a:ext uri="{FF2B5EF4-FFF2-40B4-BE49-F238E27FC236}">
-                <a16:creationId xmlns="" xmlns:a16="http://schemas.microsoft.com/office/drawing/2014/main" id="{925D99AB-7BAE-9C4D-AD59-0689508C9ADB}"/>
+                <a16:creationId xmlns:a16="http://schemas.microsoft.com/office/drawing/2014/main" xmlns="" id="{925D99AB-7BAE-9C4D-AD59-0689508C9ADB}"/>
               </a:ext>
             </a:extLst>
           </p:cNvPr>
@@ -14443,7 +14463,7 @@
           <p:cNvPr id="3" name="Text Placeholder 2">
             <a:extLst>
               <a:ext uri="{FF2B5EF4-FFF2-40B4-BE49-F238E27FC236}">
-                <a16:creationId xmlns="" xmlns:a16="http://schemas.microsoft.com/office/drawing/2014/main" id="{174007A3-0E33-634F-AF6A-A78C5D419909}"/>
+                <a16:creationId xmlns:a16="http://schemas.microsoft.com/office/drawing/2014/main" xmlns="" id="{174007A3-0E33-634F-AF6A-A78C5D419909}"/>
               </a:ext>
             </a:extLst>
           </p:cNvPr>
@@ -14962,7 +14982,6 @@
               <a:rPr lang="en-US" dirty="0" smtClean="0"/>
               <a:t>Time effect on the complaints</a:t>
             </a:r>
-            <a:endParaRPr lang="en-US" dirty="0" smtClean="0"/>
           </a:p>
           <a:p>
             <a:pPr marL="1318775" lvl="2" indent="-483115" defTabSz="549148">
@@ -16243,7 +16262,6 @@
               <a:rPr lang="en-US" sz="3600" dirty="0"/>
               <a:t>Financial product analysis</a:t>
             </a:r>
-            <a:endParaRPr lang="en-US" sz="3600" dirty="0"/>
           </a:p>
         </p:txBody>
       </p:sp>

</xml_diff>